<commit_message>
another change to image
</commit_message>
<xml_diff>
--- a/resources/images/raw/raw_combine.pptx
+++ b/resources/images/raw/raw_combine.pptx
@@ -3581,7 +3581,7 @@
         </p:blipFill>
         <p:spPr>
           <a:xfrm>
-            <a:off x="6192779" y="1303021"/>
+            <a:off x="6150584" y="1497347"/>
             <a:ext cx="4374259" cy="2240474"/>
           </a:xfrm>
           <a:prstGeom prst="rect">
@@ -3617,7 +3617,7 @@
         </p:blipFill>
         <p:spPr>
           <a:xfrm>
-            <a:off x="6272795" y="5486156"/>
+            <a:off x="6230602" y="5394708"/>
             <a:ext cx="4214225" cy="2911092"/>
           </a:xfrm>
           <a:prstGeom prst="rect">
@@ -3653,7 +3653,7 @@
         </p:blipFill>
         <p:spPr>
           <a:xfrm>
-            <a:off x="1515996" y="5341363"/>
+            <a:off x="1703122" y="5249915"/>
             <a:ext cx="4427604" cy="3055885"/>
           </a:xfrm>
           <a:prstGeom prst="rect">
@@ -3725,7 +3725,7 @@
         </p:blipFill>
         <p:spPr>
           <a:xfrm>
-            <a:off x="-8514656" y="5364225"/>
+            <a:off x="-8514656" y="5265156"/>
             <a:ext cx="4442845" cy="3033023"/>
           </a:xfrm>
           <a:prstGeom prst="rect">

</xml_diff>